<commit_message>
shuffling files and updating metagenomics_pipe
</commit_message>
<xml_diff>
--- a/metagenomics_pipe.pptx
+++ b/metagenomics_pipe.pptx
@@ -121,6 +121,22 @@
       </a:defRPr>
     </a:lvl9pPr>
   </p:defaultTextStyle>
+  <p:extLst>
+    <p:ext uri="{EFAFB233-063F-42B5-8137-9DF3F51BA10A}">
+      <p15:sldGuideLst xmlns:p15="http://schemas.microsoft.com/office/powerpoint/2012/main">
+        <p15:guide id="1" orient="horz" pos="2160">
+          <p15:clr>
+            <a:srgbClr val="A4A3A4"/>
+          </p15:clr>
+        </p15:guide>
+        <p15:guide id="2" pos="2880">
+          <p15:clr>
+            <a:srgbClr val="A4A3A4"/>
+          </p15:clr>
+        </p15:guide>
+      </p15:sldGuideLst>
+    </p:ext>
+  </p:extLst>
 </p:presentation>
 </file>
 
@@ -206,7 +222,7 @@
           <a:p>
             <a:fld id="{8B6931B0-129E-FB41-8B29-14FDCFA4E480}" type="datetimeFigureOut">
               <a:rPr lang="en-US" smtClean="0"/>
-              <a:t>1/8/15</a:t>
+              <a:t>1/11/2015</a:t>
             </a:fld>
             <a:endParaRPr lang="en-US"/>
           </a:p>
@@ -1510,7 +1526,7 @@
           <a:p>
             <a:fld id="{7E372773-E29B-2746-896E-9DD62E351777}" type="datetimeFigureOut">
               <a:rPr lang="en-US" smtClean="0"/>
-              <a:t>1/8/15</a:t>
+              <a:t>1/11/2015</a:t>
             </a:fld>
             <a:endParaRPr lang="es-ES"/>
           </a:p>
@@ -1680,7 +1696,7 @@
           <a:p>
             <a:fld id="{7E372773-E29B-2746-896E-9DD62E351777}" type="datetimeFigureOut">
               <a:rPr lang="en-US" smtClean="0"/>
-              <a:t>1/8/15</a:t>
+              <a:t>1/11/2015</a:t>
             </a:fld>
             <a:endParaRPr lang="es-ES"/>
           </a:p>
@@ -1860,7 +1876,7 @@
           <a:p>
             <a:fld id="{7E372773-E29B-2746-896E-9DD62E351777}" type="datetimeFigureOut">
               <a:rPr lang="en-US" smtClean="0"/>
-              <a:t>1/8/15</a:t>
+              <a:t>1/11/2015</a:t>
             </a:fld>
             <a:endParaRPr lang="es-ES"/>
           </a:p>
@@ -2060,7 +2076,7 @@
                 <a:latin typeface="Calibri"/>
               </a:rPr>
               <a:pPr/>
-              <a:t>1/8/15</a:t>
+              <a:t>1/11/2015</a:t>
             </a:fld>
             <a:endParaRPr lang="en-US">
               <a:solidFill>
@@ -2267,7 +2283,7 @@
                 <a:latin typeface="Calibri"/>
               </a:rPr>
               <a:pPr/>
-              <a:t>1/8/15</a:t>
+              <a:t>1/11/2015</a:t>
             </a:fld>
             <a:endParaRPr lang="en-US">
               <a:solidFill>
@@ -2550,7 +2566,7 @@
                 <a:latin typeface="Calibri"/>
               </a:rPr>
               <a:pPr/>
-              <a:t>1/8/15</a:t>
+              <a:t>1/11/2015</a:t>
             </a:fld>
             <a:endParaRPr lang="en-US">
               <a:solidFill>
@@ -2819,7 +2835,7 @@
                 <a:latin typeface="Calibri"/>
               </a:rPr>
               <a:pPr/>
-              <a:t>1/8/15</a:t>
+              <a:t>1/11/2015</a:t>
             </a:fld>
             <a:endParaRPr lang="en-US">
               <a:solidFill>
@@ -3223,7 +3239,7 @@
                 <a:latin typeface="Calibri"/>
               </a:rPr>
               <a:pPr/>
-              <a:t>1/8/15</a:t>
+              <a:t>1/11/2015</a:t>
             </a:fld>
             <a:endParaRPr lang="en-US">
               <a:solidFill>
@@ -3378,7 +3394,7 @@
                 <a:latin typeface="Calibri"/>
               </a:rPr>
               <a:pPr/>
-              <a:t>1/8/15</a:t>
+              <a:t>1/11/2015</a:t>
             </a:fld>
             <a:endParaRPr lang="en-US">
               <a:solidFill>
@@ -3510,7 +3526,7 @@
                 <a:latin typeface="Calibri"/>
               </a:rPr>
               <a:pPr/>
-              <a:t>1/8/15</a:t>
+              <a:t>1/11/2015</a:t>
             </a:fld>
             <a:endParaRPr lang="en-US">
               <a:solidFill>
@@ -3824,7 +3840,7 @@
                 <a:latin typeface="Calibri"/>
               </a:rPr>
               <a:pPr/>
-              <a:t>1/8/15</a:t>
+              <a:t>1/11/2015</a:t>
             </a:fld>
             <a:endParaRPr lang="en-US">
               <a:solidFill>
@@ -4023,7 +4039,7 @@
           <a:p>
             <a:fld id="{7E372773-E29B-2746-896E-9DD62E351777}" type="datetimeFigureOut">
               <a:rPr lang="en-US" smtClean="0"/>
-              <a:t>1/8/15</a:t>
+              <a:t>1/11/2015</a:t>
             </a:fld>
             <a:endParaRPr lang="es-ES"/>
           </a:p>
@@ -4284,7 +4300,7 @@
                 <a:latin typeface="Calibri"/>
               </a:rPr>
               <a:pPr/>
-              <a:t>1/8/15</a:t>
+              <a:t>1/11/2015</a:t>
             </a:fld>
             <a:endParaRPr lang="en-US">
               <a:solidFill>
@@ -4491,7 +4507,7 @@
                 <a:latin typeface="Calibri"/>
               </a:rPr>
               <a:pPr/>
-              <a:t>1/8/15</a:t>
+              <a:t>1/11/2015</a:t>
             </a:fld>
             <a:endParaRPr lang="en-US">
               <a:solidFill>
@@ -4708,7 +4724,7 @@
                 <a:latin typeface="Calibri"/>
               </a:rPr>
               <a:pPr/>
-              <a:t>1/8/15</a:t>
+              <a:t>1/11/2015</a:t>
             </a:fld>
             <a:endParaRPr lang="en-US">
               <a:solidFill>
@@ -4983,7 +4999,7 @@
           <a:p>
             <a:fld id="{7E372773-E29B-2746-896E-9DD62E351777}" type="datetimeFigureOut">
               <a:rPr lang="en-US" smtClean="0"/>
-              <a:t>1/8/15</a:t>
+              <a:t>1/11/2015</a:t>
             </a:fld>
             <a:endParaRPr lang="es-ES"/>
           </a:p>
@@ -5271,7 +5287,7 @@
           <a:p>
             <a:fld id="{7E372773-E29B-2746-896E-9DD62E351777}" type="datetimeFigureOut">
               <a:rPr lang="en-US" smtClean="0"/>
-              <a:t>1/8/15</a:t>
+              <a:t>1/11/2015</a:t>
             </a:fld>
             <a:endParaRPr lang="es-ES"/>
           </a:p>
@@ -5693,7 +5709,7 @@
           <a:p>
             <a:fld id="{7E372773-E29B-2746-896E-9DD62E351777}" type="datetimeFigureOut">
               <a:rPr lang="en-US" smtClean="0"/>
-              <a:t>1/8/15</a:t>
+              <a:t>1/11/2015</a:t>
             </a:fld>
             <a:endParaRPr lang="es-ES"/>
           </a:p>
@@ -5811,7 +5827,7 @@
           <a:p>
             <a:fld id="{7E372773-E29B-2746-896E-9DD62E351777}" type="datetimeFigureOut">
               <a:rPr lang="en-US" smtClean="0"/>
-              <a:t>1/8/15</a:t>
+              <a:t>1/11/2015</a:t>
             </a:fld>
             <a:endParaRPr lang="es-ES"/>
           </a:p>
@@ -5906,7 +5922,7 @@
           <a:p>
             <a:fld id="{7E372773-E29B-2746-896E-9DD62E351777}" type="datetimeFigureOut">
               <a:rPr lang="en-US" smtClean="0"/>
-              <a:t>1/8/15</a:t>
+              <a:t>1/11/2015</a:t>
             </a:fld>
             <a:endParaRPr lang="es-ES"/>
           </a:p>
@@ -6183,7 +6199,7 @@
           <a:p>
             <a:fld id="{7E372773-E29B-2746-896E-9DD62E351777}" type="datetimeFigureOut">
               <a:rPr lang="en-US" smtClean="0"/>
-              <a:t>1/8/15</a:t>
+              <a:t>1/11/2015</a:t>
             </a:fld>
             <a:endParaRPr lang="es-ES"/>
           </a:p>
@@ -6436,7 +6452,7 @@
           <a:p>
             <a:fld id="{7E372773-E29B-2746-896E-9DD62E351777}" type="datetimeFigureOut">
               <a:rPr lang="en-US" smtClean="0"/>
-              <a:t>1/8/15</a:t>
+              <a:t>1/11/2015</a:t>
             </a:fld>
             <a:endParaRPr lang="es-ES"/>
           </a:p>
@@ -6649,7 +6665,7 @@
           <a:p>
             <a:fld id="{7E372773-E29B-2746-896E-9DD62E351777}" type="datetimeFigureOut">
               <a:rPr lang="en-US" smtClean="0"/>
-              <a:t>1/8/15</a:t>
+              <a:t>1/11/2015</a:t>
             </a:fld>
             <a:endParaRPr lang="es-ES"/>
           </a:p>
@@ -7168,7 +7184,7 @@
                 <a:latin typeface="Calibri"/>
               </a:rPr>
               <a:pPr defTabSz="914400"/>
-              <a:t>1/8/15</a:t>
+              <a:t>1/11/2015</a:t>
             </a:fld>
             <a:endParaRPr lang="en-US">
               <a:solidFill>
@@ -7810,7 +7826,7 @@
   <p:timing>
     <p:tnLst>
       <p:par>
-        <p:cTn xmlns:p14="http://schemas.microsoft.com/office/powerpoint/2010/main" id="1" dur="indefinite" restart="never" nodeType="tmRoot"/>
+        <p:cTn id="1" dur="indefinite" restart="never" nodeType="tmRoot"/>
       </p:par>
     </p:tnLst>
   </p:timing>
@@ -7947,7 +7963,7 @@
   <p:timing>
     <p:tnLst>
       <p:par>
-        <p:cTn xmlns:p14="http://schemas.microsoft.com/office/powerpoint/2010/main" id="1" dur="indefinite" restart="never" nodeType="tmRoot"/>
+        <p:cTn id="1" dur="indefinite" restart="never" nodeType="tmRoot"/>
       </p:par>
     </p:tnLst>
   </p:timing>
@@ -8110,7 +8126,7 @@
   <p:timing>
     <p:tnLst>
       <p:par>
-        <p:cTn xmlns:p14="http://schemas.microsoft.com/office/powerpoint/2010/main" id="1" dur="indefinite" restart="never" nodeType="tmRoot"/>
+        <p:cTn id="1" dur="indefinite" restart="never" nodeType="tmRoot"/>
       </p:par>
     </p:tnLst>
   </p:timing>
@@ -8542,7 +8558,7 @@
         </p:nvSpPr>
         <p:spPr>
           <a:xfrm>
-            <a:off x="628650" y="136521"/>
+            <a:off x="628650" y="137160"/>
             <a:ext cx="7886700" cy="654783"/>
           </a:xfrm>
           <a:prstGeom prst="rect">
@@ -8603,7 +8619,7 @@
   <p:timing>
     <p:tnLst>
       <p:par>
-        <p:cTn xmlns:p14="http://schemas.microsoft.com/office/powerpoint/2010/main" id="1" dur="indefinite" restart="never" nodeType="tmRoot"/>
+        <p:cTn id="1" dur="indefinite" restart="never" nodeType="tmRoot"/>
       </p:par>
     </p:tnLst>
   </p:timing>
@@ -9205,7 +9221,7 @@
   <p:timing>
     <p:tnLst>
       <p:par>
-        <p:cTn xmlns:p14="http://schemas.microsoft.com/office/powerpoint/2010/main" id="1" dur="indefinite" restart="never" nodeType="tmRoot"/>
+        <p:cTn id="1" dur="indefinite" restart="never" nodeType="tmRoot"/>
       </p:par>
     </p:tnLst>
   </p:timing>
@@ -9280,8 +9296,8 @@
         </p:nvSpPr>
         <p:spPr>
           <a:xfrm>
-            <a:off x="0" y="822960"/>
-            <a:ext cx="9144000" cy="6035040"/>
+            <a:off x="0" y="731520"/>
+            <a:ext cx="9144000" cy="6126480"/>
           </a:xfrm>
         </p:spPr>
         <p:txBody>
@@ -9299,11 +9315,11 @@
               </a:spcBef>
             </a:pPr>
             <a:r>
-              <a:rPr lang="en-US" sz="1800" dirty="0" err="1" smtClean="0"/>
+              <a:rPr lang="en-US" sz="2000" dirty="0" err="1" smtClean="0"/>
               <a:t>blastn_vdb</a:t>
             </a:r>
             <a:r>
-              <a:rPr lang="en-US" sz="1800" dirty="0" smtClean="0"/>
+              <a:rPr lang="en-US" sz="2000" dirty="0" smtClean="0"/>
               <a:t> requires [DES]RR at start of SRA archive used as the subject database</a:t>
             </a:r>
           </a:p>
@@ -9317,11 +9333,11 @@
               </a:spcBef>
             </a:pPr>
             <a:r>
-              <a:rPr lang="en-US" sz="1800" dirty="0" err="1" smtClean="0"/>
+              <a:rPr lang="en-US" sz="2000" dirty="0" err="1" smtClean="0"/>
               <a:t>blastn_vdb</a:t>
             </a:r>
             <a:r>
-              <a:rPr lang="en-US" sz="1800" dirty="0" smtClean="0"/>
+              <a:rPr lang="en-US" sz="2000" dirty="0" smtClean="0"/>
               <a:t> gets confused if you have a suffix other than .sra on the subject archive (e.g. SRR000001.foo). Use ‘SRR000001foo’ or ‘SRR000001’ instead.</a:t>
             </a:r>
           </a:p>
@@ -9335,72 +9351,56 @@
               </a:spcBef>
             </a:pPr>
             <a:r>
-              <a:rPr lang="en-US" sz="1800" dirty="0" err="1" smtClean="0"/>
+              <a:rPr lang="en-US" sz="2000" dirty="0" err="1" smtClean="0"/>
               <a:t>blastn_vdb</a:t>
             </a:r>
             <a:r>
-              <a:rPr lang="en-US" sz="1800" dirty="0" smtClean="0"/>
+              <a:rPr lang="en-US" sz="2000" dirty="0" smtClean="0"/>
               <a:t> is more effective for non-aligned SRA archives rather than archives using reference-based compression (called ‘</a:t>
             </a:r>
             <a:r>
-              <a:rPr lang="en-US" sz="1800" dirty="0" err="1" smtClean="0"/>
+              <a:rPr lang="en-US" sz="2000" dirty="0" err="1" smtClean="0"/>
               <a:t>csra</a:t>
             </a:r>
             <a:r>
-              <a:rPr lang="en-US" sz="1800" dirty="0" smtClean="0"/>
-              <a:t>’). A more effective solution for alignment-based archives is currently being developed. To determine if you have a </a:t>
-            </a:r>
-            <a:r>
-              <a:rPr lang="en-US" sz="1800" dirty="0" err="1" smtClean="0"/>
+              <a:rPr lang="en-US" sz="2000" dirty="0" smtClean="0"/>
+              <a:t>’). A more effective solution for alignment-based archives is currently being developed. </a:t>
+            </a:r>
+            <a:r>
+              <a:rPr lang="en-US" sz="2000" dirty="0"/>
+              <a:t>To determine if you have a </a:t>
+            </a:r>
+            <a:r>
+              <a:rPr lang="en-US" sz="2000" dirty="0" err="1"/>
               <a:t>csra</a:t>
             </a:r>
             <a:r>
-              <a:rPr lang="en-US" sz="1800" dirty="0" smtClean="0"/>
-              <a:t>, look for an alignment tab at the SRA run browser or run ‘align-info’:</a:t>
-            </a:r>
-          </a:p>
-          <a:p>
-            <a:pPr marL="0" indent="0">
-              <a:lnSpc>
-                <a:spcPts val="2700"/>
-              </a:lnSpc>
-              <a:spcBef>
-                <a:spcPts val="400"/>
-              </a:spcBef>
-              <a:buNone/>
-            </a:pPr>
-            <a:r>
-              <a:rPr lang="en-US" sz="1800" dirty="0" smtClean="0"/>
-              <a:t>	http</a:t>
-            </a:r>
-            <a:r>
-              <a:rPr lang="en-US" sz="1800" dirty="0"/>
-              <a:t>://trace.ncbi.nlm.nih.gov/Traces/sra/?run=SRR1696450</a:t>
-            </a:r>
-            <a:endParaRPr lang="en-US" sz="1800" dirty="0" smtClean="0"/>
-          </a:p>
-          <a:p>
-            <a:pPr marL="0" indent="0">
-              <a:lnSpc>
-                <a:spcPts val="2700"/>
-              </a:lnSpc>
-              <a:spcBef>
-                <a:spcPts val="400"/>
-              </a:spcBef>
-              <a:buNone/>
-            </a:pPr>
-            <a:r>
-              <a:rPr lang="en-US" sz="1800" dirty="0" smtClean="0"/>
-              <a:t>	</a:t>
-            </a:r>
-            <a:r>
-              <a:rPr lang="en-US" sz="1800" dirty="0"/>
-              <a:t>align-info </a:t>
-            </a:r>
-            <a:r>
-              <a:rPr lang="en-US" sz="1800" dirty="0" smtClean="0"/>
-              <a:t>SRR1696450 | head</a:t>
-            </a:r>
+              <a:rPr lang="en-US" sz="2000" dirty="0"/>
+              <a:t>, look for an alignment tab at the </a:t>
+            </a:r>
+            <a:r>
+              <a:rPr lang="en-US" sz="2000" dirty="0">
+                <a:hlinkClick r:id="rId2"/>
+              </a:rPr>
+              <a:t>SRA Run Browser</a:t>
+            </a:r>
+            <a:r>
+              <a:rPr lang="en-US" sz="2000" dirty="0"/>
+              <a:t> or run </a:t>
+            </a:r>
+            <a:r>
+              <a:rPr lang="en-US" sz="2000" dirty="0" smtClean="0"/>
+              <a:t>‘align-info &lt;archive&gt;| </a:t>
+            </a:r>
+            <a:r>
+              <a:rPr lang="en-US" sz="2000" dirty="0"/>
+              <a:t>head</a:t>
+            </a:r>
+            <a:r>
+              <a:rPr lang="en-US" sz="2000" dirty="0" smtClean="0"/>
+              <a:t>’.</a:t>
+            </a:r>
+            <a:endParaRPr lang="en-US" sz="2000" dirty="0"/>
           </a:p>
           <a:p>
             <a:pPr>
@@ -9412,55 +9412,59 @@
               </a:spcBef>
             </a:pPr>
             <a:r>
-              <a:rPr lang="en-US" sz="1800" dirty="0" smtClean="0"/>
-              <a:t>You can use ‘</a:t>
-            </a:r>
-            <a:r>
-              <a:rPr lang="en-US" sz="1800" dirty="0" err="1" smtClean="0"/>
+              <a:rPr lang="en-US" sz="2000" dirty="0" smtClean="0"/>
+              <a:t>You </a:t>
+            </a:r>
+            <a:r>
+              <a:rPr lang="en-US" sz="2000" dirty="0" smtClean="0"/>
+              <a:t>can use ‘</a:t>
+            </a:r>
+            <a:r>
+              <a:rPr lang="en-US" sz="2000" dirty="0" err="1" smtClean="0"/>
               <a:t>prefetch</a:t>
             </a:r>
             <a:r>
-              <a:rPr lang="en-US" sz="1800" dirty="0" smtClean="0"/>
+              <a:rPr lang="en-US" sz="2000" dirty="0" smtClean="0"/>
               <a:t>’ to pull an archive before running </a:t>
             </a:r>
             <a:r>
-              <a:rPr lang="en-US" sz="1800" dirty="0" err="1" smtClean="0"/>
+              <a:rPr lang="en-US" sz="2000" dirty="0" err="1" smtClean="0"/>
               <a:t>blastn_vdb</a:t>
             </a:r>
             <a:r>
-              <a:rPr lang="en-US" sz="1800" dirty="0" smtClean="0"/>
+              <a:rPr lang="en-US" sz="2000" dirty="0" smtClean="0"/>
               <a:t> and the result will be in the ‘sra’ sub-directory of your public or </a:t>
             </a:r>
             <a:r>
-              <a:rPr lang="en-US" sz="1800" dirty="0" err="1" smtClean="0"/>
+              <a:rPr lang="en-US" sz="2000" dirty="0" err="1" smtClean="0"/>
               <a:t>dbGap</a:t>
             </a:r>
             <a:r>
-              <a:rPr lang="en-US" sz="1800" dirty="0" smtClean="0"/>
+              <a:rPr lang="en-US" sz="2000" dirty="0" smtClean="0"/>
               <a:t> folder (e.g. /home/bob/</a:t>
             </a:r>
             <a:r>
-              <a:rPr lang="en-US" sz="1800" dirty="0" err="1" smtClean="0"/>
+              <a:rPr lang="en-US" sz="2000" dirty="0" err="1" smtClean="0"/>
               <a:t>ncbi</a:t>
             </a:r>
             <a:r>
-              <a:rPr lang="en-US" sz="1800" dirty="0" smtClean="0"/>
+              <a:rPr lang="en-US" sz="2000" dirty="0" smtClean="0"/>
               <a:t>/public/sra). Or you can execute </a:t>
             </a:r>
             <a:r>
-              <a:rPr lang="en-US" sz="1800" dirty="0" err="1" smtClean="0"/>
+              <a:rPr lang="en-US" sz="2000" dirty="0" err="1" smtClean="0"/>
               <a:t>blastn_vdb</a:t>
             </a:r>
             <a:r>
-              <a:rPr lang="en-US" sz="1800" dirty="0" smtClean="0"/>
+              <a:rPr lang="en-US" sz="2000" dirty="0" smtClean="0"/>
               <a:t> without </a:t>
             </a:r>
             <a:r>
-              <a:rPr lang="en-US" sz="1800" dirty="0" err="1" smtClean="0"/>
+              <a:rPr lang="en-US" sz="2000" dirty="0" err="1" smtClean="0"/>
               <a:t>prefetch</a:t>
             </a:r>
             <a:r>
-              <a:rPr lang="en-US" sz="1800" dirty="0" smtClean="0"/>
+              <a:rPr lang="en-US" sz="2000" dirty="0" smtClean="0"/>
               <a:t> and it will run as the download is occurring.</a:t>
             </a:r>
           </a:p>
@@ -9474,15 +9478,15 @@
               </a:spcBef>
             </a:pPr>
             <a:r>
-              <a:rPr lang="en-US" sz="1800" dirty="0" smtClean="0"/>
+              <a:rPr lang="en-US" sz="2000" dirty="0" smtClean="0"/>
               <a:t>Downloaded archives are already in a ‘</a:t>
             </a:r>
             <a:r>
-              <a:rPr lang="en-US" sz="1800" dirty="0" err="1" smtClean="0"/>
+              <a:rPr lang="en-US" sz="2000" dirty="0" err="1" smtClean="0"/>
               <a:t>kar</a:t>
             </a:r>
             <a:r>
-              <a:rPr lang="en-US" sz="1800" dirty="0" smtClean="0"/>
+              <a:rPr lang="en-US" sz="2000" dirty="0" smtClean="0"/>
               <a:t>’ format</a:t>
             </a:r>
           </a:p>
@@ -9496,23 +9500,23 @@
               </a:spcBef>
             </a:pPr>
             <a:r>
-              <a:rPr lang="en-US" sz="1800" dirty="0" err="1" smtClean="0"/>
+              <a:rPr lang="en-US" sz="2000" dirty="0" err="1" smtClean="0"/>
               <a:t>blastn_vdb</a:t>
             </a:r>
             <a:r>
-              <a:rPr lang="en-US" sz="1800" dirty="0" smtClean="0"/>
+              <a:rPr lang="en-US" sz="2000" dirty="0" smtClean="0"/>
               <a:t> can be </a:t>
             </a:r>
             <a:r>
-              <a:rPr lang="en-US" sz="1800" dirty="0"/>
+              <a:rPr lang="en-US" sz="2000" dirty="0"/>
               <a:t>multi-threaded using the ‘-</a:t>
             </a:r>
             <a:r>
-              <a:rPr lang="en-US" sz="1800" dirty="0" err="1" smtClean="0"/>
+              <a:rPr lang="en-US" sz="2000" dirty="0" err="1" smtClean="0"/>
               <a:t>num_threads</a:t>
             </a:r>
             <a:r>
-              <a:rPr lang="en-US" sz="1800" dirty="0" smtClean="0"/>
+              <a:rPr lang="en-US" sz="2000" dirty="0" smtClean="0"/>
               <a:t>’ option</a:t>
             </a:r>
           </a:p>
@@ -9526,32 +9530,45 @@
               </a:spcBef>
             </a:pPr>
             <a:r>
-              <a:rPr lang="en-US" sz="1800" dirty="0" smtClean="0"/>
+              <a:rPr lang="en-US" sz="2000" dirty="0" err="1"/>
+              <a:t>blastn_vdb</a:t>
+            </a:r>
+            <a:r>
+              <a:rPr lang="en-US" sz="2000" dirty="0"/>
+              <a:t> results cannot be reformatted with </a:t>
+            </a:r>
+            <a:r>
+              <a:rPr lang="en-US" sz="2000" dirty="0" err="1"/>
+              <a:t>blast_formatter</a:t>
+            </a:r>
+            <a:endParaRPr lang="en-US" sz="2000" dirty="0"/>
+          </a:p>
+          <a:p>
+            <a:pPr>
+              <a:lnSpc>
+                <a:spcPts val="2700"/>
+              </a:lnSpc>
+              <a:spcBef>
+                <a:spcPts val="400"/>
+              </a:spcBef>
+            </a:pPr>
+            <a:r>
+              <a:rPr lang="en-US" sz="2000" dirty="0" smtClean="0"/>
               <a:t>One </a:t>
             </a:r>
             <a:r>
-              <a:rPr lang="en-US" sz="1800" dirty="0"/>
-              <a:t>command line </a:t>
-            </a:r>
-            <a:r>
-              <a:rPr lang="en-US" sz="1800" dirty="0" err="1"/>
+              <a:rPr lang="en-US" sz="2000" dirty="0" err="1" smtClean="0"/>
               <a:t>blastn_vdb</a:t>
             </a:r>
             <a:r>
-              <a:rPr lang="en-US" sz="1800" dirty="0"/>
-              <a:t> execution reached completion (i.e. indication of subject and query database sizes in output) and then presented an </a:t>
-            </a:r>
-            <a:r>
-              <a:rPr lang="en-US" sz="1800" dirty="0" smtClean="0"/>
-              <a:t>error. This result will be investigated.</a:t>
-            </a:r>
-            <a:endParaRPr lang="en-US" sz="1800" dirty="0"/>
-          </a:p>
-          <a:p>
-            <a:pPr marL="0" indent="0">
-              <a:buNone/>
-            </a:pPr>
-            <a:endParaRPr lang="en-US" sz="1800" dirty="0"/>
+              <a:rPr lang="en-US" sz="2000" dirty="0" smtClean="0"/>
+              <a:t> execution completed (i.e. indicated letters and sequences in database) and then presented an error. This result will be </a:t>
+            </a:r>
+            <a:r>
+              <a:rPr lang="en-US" sz="2000" smtClean="0"/>
+              <a:t>investigated.</a:t>
+            </a:r>
+            <a:endParaRPr lang="en-US" sz="2000" dirty="0" smtClean="0"/>
           </a:p>
         </p:txBody>
       </p:sp>
@@ -9568,7 +9585,7 @@
   <p:timing>
     <p:tnLst>
       <p:par>
-        <p:cTn xmlns:p14="http://schemas.microsoft.com/office/powerpoint/2010/main" id="1" dur="indefinite" restart="never" nodeType="tmRoot"/>
+        <p:cTn id="1" dur="indefinite" restart="never" nodeType="tmRoot"/>
       </p:par>
     </p:tnLst>
   </p:timing>
@@ -9963,7 +9980,7 @@
   <p:timing>
     <p:tnLst>
       <p:par>
-        <p:cTn xmlns:p14="http://schemas.microsoft.com/office/powerpoint/2010/main" id="1" dur="indefinite" restart="never" nodeType="tmRoot"/>
+        <p:cTn id="1" dur="indefinite" restart="never" nodeType="tmRoot"/>
       </p:par>
     </p:tnLst>
   </p:timing>
@@ -10409,7 +10426,7 @@
   <p:timing>
     <p:tnLst>
       <p:par>
-        <p:cTn xmlns:p14="http://schemas.microsoft.com/office/powerpoint/2010/main" id="1" dur="indefinite" restart="never" nodeType="tmRoot"/>
+        <p:cTn id="1" dur="indefinite" restart="never" nodeType="tmRoot"/>
       </p:par>
     </p:tnLst>
   </p:timing>
@@ -10936,7 +10953,7 @@
   <p:timing>
     <p:tnLst>
       <p:par>
-        <p:cTn xmlns:p14="http://schemas.microsoft.com/office/powerpoint/2010/main" id="1" dur="indefinite" restart="never" nodeType="tmRoot"/>
+        <p:cTn id="1" dur="indefinite" restart="never" nodeType="tmRoot"/>
       </p:par>
     </p:tnLst>
   </p:timing>
@@ -11523,7 +11540,7 @@
   <p:timing>
     <p:tnLst>
       <p:par>
-        <p:cTn xmlns:p14="http://schemas.microsoft.com/office/powerpoint/2010/main" id="1" dur="indefinite" restart="never" nodeType="tmRoot">
+        <p:cTn id="1" dur="indefinite" restart="never" nodeType="tmRoot">
           <p:childTnLst>
             <p:seq concurrent="1" nextAc="seek">
               <p:cTn id="2" dur="indefinite" nodeType="mainSeq">
@@ -12136,7 +12153,7 @@
   <p:timing>
     <p:tnLst>
       <p:par>
-        <p:cTn xmlns:p14="http://schemas.microsoft.com/office/powerpoint/2010/main" id="1" dur="indefinite" restart="never" nodeType="tmRoot"/>
+        <p:cTn id="1" dur="indefinite" restart="never" nodeType="tmRoot"/>
       </p:par>
     </p:tnLst>
   </p:timing>
@@ -12843,7 +12860,7 @@
   <p:timing>
     <p:tnLst>
       <p:par>
-        <p:cTn xmlns:p14="http://schemas.microsoft.com/office/powerpoint/2010/main" id="1" dur="indefinite" restart="never" nodeType="tmRoot"/>
+        <p:cTn id="1" dur="indefinite" restart="never" nodeType="tmRoot"/>
       </p:par>
     </p:tnLst>
   </p:timing>
@@ -13364,7 +13381,7 @@
   <p:timing>
     <p:tnLst>
       <p:par>
-        <p:cTn xmlns:p14="http://schemas.microsoft.com/office/powerpoint/2010/main" id="1" dur="indefinite" restart="never" nodeType="tmRoot"/>
+        <p:cTn id="1" dur="indefinite" restart="never" nodeType="tmRoot"/>
       </p:par>
     </p:tnLst>
   </p:timing>
@@ -13998,7 +14015,7 @@
   <p:timing>
     <p:tnLst>
       <p:par>
-        <p:cTn xmlns:p14="http://schemas.microsoft.com/office/powerpoint/2010/main" id="1" dur="indefinite" restart="never" nodeType="tmRoot"/>
+        <p:cTn id="1" dur="indefinite" restart="never" nodeType="tmRoot"/>
       </p:par>
     </p:tnLst>
   </p:timing>
@@ -14580,7 +14597,7 @@
   <a:extraClrSchemeLst/>
   <a:extLst>
     <a:ext uri="{05A4C25C-085E-4340-85A3-A5531E510DB2}">
-      <thm15:themeFamily xmlns="" xmlns:thm15="http://schemas.microsoft.com/office/thememl/2012/main" name="Office Theme" id="{62F939B6-93AF-4DB8-9C6B-D6C7DFDC589F}" vid="{4A3C46E8-61CC-4603-A589-7422A47A8E4A}"/>
+      <thm15:themeFamily xmlns:thm15="http://schemas.microsoft.com/office/thememl/2012/main" name="Office Theme" id="{62F939B6-93AF-4DB8-9C6B-D6C7DFDC589F}" vid="{4A3C46E8-61CC-4603-A589-7422A47A8E4A}"/>
     </a:ext>
   </a:extLst>
 </a:theme>

</xml_diff>